<commit_message>
tests(pptx): add a linked image to test the fix on e69779e
Signed-off-by: Cesar Berrospi Ramis <ceb@zurich.ibm.com>
</commit_message>
<xml_diff>
--- a/tests/data/pptx/powerpoint_with_image.pptx
+++ b/tests/data/pptx/powerpoint_with_image.pptx
@@ -104,6 +104,11 @@
       </a:defRPr>
     </a:lvl9pPr>
   </p:defaultTextStyle>
+  <p:extLst>
+    <p:ext uri="{EFAFB233-063F-42B5-8137-9DF3F51BA10A}">
+      <p15:sldGuideLst xmlns:p15="http://schemas.microsoft.com/office/powerpoint/2012/main"/>
+    </p:ext>
+  </p:extLst>
 </p:presentation>
 </file>
 
@@ -254,7 +259,7 @@
           <a:p>
             <a:fld id="{22C88FD7-B5A4-B541-9894-CD062EA3E37C}" type="datetimeFigureOut">
               <a:rPr lang="en-US" smtClean="0"/>
-              <a:t>11/15/24</a:t>
+              <a:t>1/30/26</a:t>
             </a:fld>
             <a:endParaRPr lang="en-US"/>
           </a:p>
@@ -452,7 +457,7 @@
           <a:p>
             <a:fld id="{22C88FD7-B5A4-B541-9894-CD062EA3E37C}" type="datetimeFigureOut">
               <a:rPr lang="en-US" smtClean="0"/>
-              <a:t>11/15/24</a:t>
+              <a:t>1/30/26</a:t>
             </a:fld>
             <a:endParaRPr lang="en-US"/>
           </a:p>
@@ -660,7 +665,7 @@
           <a:p>
             <a:fld id="{22C88FD7-B5A4-B541-9894-CD062EA3E37C}" type="datetimeFigureOut">
               <a:rPr lang="en-US" smtClean="0"/>
-              <a:t>11/15/24</a:t>
+              <a:t>1/30/26</a:t>
             </a:fld>
             <a:endParaRPr lang="en-US"/>
           </a:p>
@@ -858,7 +863,7 @@
           <a:p>
             <a:fld id="{22C88FD7-B5A4-B541-9894-CD062EA3E37C}" type="datetimeFigureOut">
               <a:rPr lang="en-US" smtClean="0"/>
-              <a:t>11/15/24</a:t>
+              <a:t>1/30/26</a:t>
             </a:fld>
             <a:endParaRPr lang="en-US"/>
           </a:p>
@@ -1133,7 +1138,7 @@
           <a:p>
             <a:fld id="{22C88FD7-B5A4-B541-9894-CD062EA3E37C}" type="datetimeFigureOut">
               <a:rPr lang="en-US" smtClean="0"/>
-              <a:t>11/15/24</a:t>
+              <a:t>1/30/26</a:t>
             </a:fld>
             <a:endParaRPr lang="en-US"/>
           </a:p>
@@ -1398,7 +1403,7 @@
           <a:p>
             <a:fld id="{22C88FD7-B5A4-B541-9894-CD062EA3E37C}" type="datetimeFigureOut">
               <a:rPr lang="en-US" smtClean="0"/>
-              <a:t>11/15/24</a:t>
+              <a:t>1/30/26</a:t>
             </a:fld>
             <a:endParaRPr lang="en-US"/>
           </a:p>
@@ -1810,7 +1815,7 @@
           <a:p>
             <a:fld id="{22C88FD7-B5A4-B541-9894-CD062EA3E37C}" type="datetimeFigureOut">
               <a:rPr lang="en-US" smtClean="0"/>
-              <a:t>11/15/24</a:t>
+              <a:t>1/30/26</a:t>
             </a:fld>
             <a:endParaRPr lang="en-US"/>
           </a:p>
@@ -1951,7 +1956,7 @@
           <a:p>
             <a:fld id="{22C88FD7-B5A4-B541-9894-CD062EA3E37C}" type="datetimeFigureOut">
               <a:rPr lang="en-US" smtClean="0"/>
-              <a:t>11/15/24</a:t>
+              <a:t>1/30/26</a:t>
             </a:fld>
             <a:endParaRPr lang="en-US"/>
           </a:p>
@@ -2064,7 +2069,7 @@
           <a:p>
             <a:fld id="{22C88FD7-B5A4-B541-9894-CD062EA3E37C}" type="datetimeFigureOut">
               <a:rPr lang="en-US" smtClean="0"/>
-              <a:t>11/15/24</a:t>
+              <a:t>1/30/26</a:t>
             </a:fld>
             <a:endParaRPr lang="en-US"/>
           </a:p>
@@ -2375,7 +2380,7 @@
           <a:p>
             <a:fld id="{22C88FD7-B5A4-B541-9894-CD062EA3E37C}" type="datetimeFigureOut">
               <a:rPr lang="en-US" smtClean="0"/>
-              <a:t>11/15/24</a:t>
+              <a:t>1/30/26</a:t>
             </a:fld>
             <a:endParaRPr lang="en-US"/>
           </a:p>
@@ -2663,7 +2668,7 @@
           <a:p>
             <a:fld id="{22C88FD7-B5A4-B541-9894-CD062EA3E37C}" type="datetimeFigureOut">
               <a:rPr lang="en-US" smtClean="0"/>
-              <a:t>11/15/24</a:t>
+              <a:t>1/30/26</a:t>
             </a:fld>
             <a:endParaRPr lang="en-US"/>
           </a:p>
@@ -2904,7 +2909,7 @@
           <a:p>
             <a:fld id="{22C88FD7-B5A4-B541-9894-CD062EA3E37C}" type="datetimeFigureOut">
               <a:rPr lang="en-US" smtClean="0"/>
-              <a:t>11/15/24</a:t>
+              <a:t>1/30/26</a:t>
             </a:fld>
             <a:endParaRPr lang="en-US"/>
           </a:p>
@@ -3418,6 +3423,235 @@
           </a:prstGeom>
         </p:spPr>
       </p:pic>
+      <p:pic>
+        <p:nvPicPr>
+          <p:cNvPr id="6" name="Picture 5" descr="A cartoon duck holding a paper&#10;&#10;AI-generated content may be incorrect.">
+            <a:extLst>
+              <a:ext uri="{FF2B5EF4-FFF2-40B4-BE49-F238E27FC236}">
+                <a16:creationId xmlns:a16="http://schemas.microsoft.com/office/drawing/2014/main" id="{C9B5DA62-3A0F-9035-66C6-3BF76C2DFD8B}"/>
+              </a:ext>
+            </a:extLst>
+          </p:cNvPr>
+          <p:cNvPicPr>
+            <a:picLocks noChangeAspect="1"/>
+          </p:cNvPicPr>
+          <p:nvPr/>
+        </p:nvPicPr>
+        <p:blipFill>
+          <a:blip r:link="rId3"/>
+          <a:stretch>
+            <a:fillRect/>
+          </a:stretch>
+        </p:blipFill>
+        <p:spPr>
+          <a:xfrm>
+            <a:off x="5689599" y="5407188"/>
+            <a:ext cx="809297" cy="809297"/>
+          </a:xfrm>
+          <a:prstGeom prst="rect">
+            <a:avLst/>
+          </a:prstGeom>
+        </p:spPr>
+      </p:pic>
+      <p:sp>
+        <p:nvSpPr>
+          <p:cNvPr id="7" name="Subtitle 2">
+            <a:extLst>
+              <a:ext uri="{FF2B5EF4-FFF2-40B4-BE49-F238E27FC236}">
+                <a16:creationId xmlns:a16="http://schemas.microsoft.com/office/drawing/2014/main" id="{AFB2A747-FFCD-668F-D21A-79290F5F2070}"/>
+              </a:ext>
+            </a:extLst>
+          </p:cNvPr>
+          <p:cNvSpPr txBox="1">
+            <a:spLocks/>
+          </p:cNvSpPr>
+          <p:nvPr/>
+        </p:nvSpPr>
+        <p:spPr>
+          <a:xfrm>
+            <a:off x="4965460" y="4503683"/>
+            <a:ext cx="2647195" cy="433934"/>
+          </a:xfrm>
+          <a:prstGeom prst="rect">
+            <a:avLst/>
+          </a:prstGeom>
+        </p:spPr>
+        <p:txBody>
+          <a:bodyPr vert="horz" lIns="91440" tIns="45720" rIns="91440" bIns="45720" rtlCol="0">
+            <a:normAutofit/>
+          </a:bodyPr>
+          <a:lstStyle>
+            <a:lvl1pPr marL="0" indent="0" algn="ctr" defTabSz="914400" rtl="0" eaLnBrk="1" latinLnBrk="0" hangingPunct="1">
+              <a:lnSpc>
+                <a:spcPct val="90000"/>
+              </a:lnSpc>
+              <a:spcBef>
+                <a:spcPts val="1000"/>
+              </a:spcBef>
+              <a:buFont typeface="Arial" panose="020B0604020202020204" pitchFamily="34" charset="0"/>
+              <a:buNone/>
+              <a:defRPr sz="2400" kern="1200">
+                <a:solidFill>
+                  <a:schemeClr val="tx1"/>
+                </a:solidFill>
+                <a:latin typeface="+mn-lt"/>
+                <a:ea typeface="+mn-ea"/>
+                <a:cs typeface="+mn-cs"/>
+              </a:defRPr>
+            </a:lvl1pPr>
+            <a:lvl2pPr marL="457200" indent="0" algn="ctr" defTabSz="914400" rtl="0" eaLnBrk="1" latinLnBrk="0" hangingPunct="1">
+              <a:lnSpc>
+                <a:spcPct val="90000"/>
+              </a:lnSpc>
+              <a:spcBef>
+                <a:spcPts val="500"/>
+              </a:spcBef>
+              <a:buFont typeface="Arial" panose="020B0604020202020204" pitchFamily="34" charset="0"/>
+              <a:buNone/>
+              <a:defRPr sz="2000" kern="1200">
+                <a:solidFill>
+                  <a:schemeClr val="tx1"/>
+                </a:solidFill>
+                <a:latin typeface="+mn-lt"/>
+                <a:ea typeface="+mn-ea"/>
+                <a:cs typeface="+mn-cs"/>
+              </a:defRPr>
+            </a:lvl2pPr>
+            <a:lvl3pPr marL="914400" indent="0" algn="ctr" defTabSz="914400" rtl="0" eaLnBrk="1" latinLnBrk="0" hangingPunct="1">
+              <a:lnSpc>
+                <a:spcPct val="90000"/>
+              </a:lnSpc>
+              <a:spcBef>
+                <a:spcPts val="500"/>
+              </a:spcBef>
+              <a:buFont typeface="Arial" panose="020B0604020202020204" pitchFamily="34" charset="0"/>
+              <a:buNone/>
+              <a:defRPr sz="1800" kern="1200">
+                <a:solidFill>
+                  <a:schemeClr val="tx1"/>
+                </a:solidFill>
+                <a:latin typeface="+mn-lt"/>
+                <a:ea typeface="+mn-ea"/>
+                <a:cs typeface="+mn-cs"/>
+              </a:defRPr>
+            </a:lvl3pPr>
+            <a:lvl4pPr marL="1371600" indent="0" algn="ctr" defTabSz="914400" rtl="0" eaLnBrk="1" latinLnBrk="0" hangingPunct="1">
+              <a:lnSpc>
+                <a:spcPct val="90000"/>
+              </a:lnSpc>
+              <a:spcBef>
+                <a:spcPts val="500"/>
+              </a:spcBef>
+              <a:buFont typeface="Arial" panose="020B0604020202020204" pitchFamily="34" charset="0"/>
+              <a:buNone/>
+              <a:defRPr sz="1600" kern="1200">
+                <a:solidFill>
+                  <a:schemeClr val="tx1"/>
+                </a:solidFill>
+                <a:latin typeface="+mn-lt"/>
+                <a:ea typeface="+mn-ea"/>
+                <a:cs typeface="+mn-cs"/>
+              </a:defRPr>
+            </a:lvl4pPr>
+            <a:lvl5pPr marL="1828800" indent="0" algn="ctr" defTabSz="914400" rtl="0" eaLnBrk="1" latinLnBrk="0" hangingPunct="1">
+              <a:lnSpc>
+                <a:spcPct val="90000"/>
+              </a:lnSpc>
+              <a:spcBef>
+                <a:spcPts val="500"/>
+              </a:spcBef>
+              <a:buFont typeface="Arial" panose="020B0604020202020204" pitchFamily="34" charset="0"/>
+              <a:buNone/>
+              <a:defRPr sz="1600" kern="1200">
+                <a:solidFill>
+                  <a:schemeClr val="tx1"/>
+                </a:solidFill>
+                <a:latin typeface="+mn-lt"/>
+                <a:ea typeface="+mn-ea"/>
+                <a:cs typeface="+mn-cs"/>
+              </a:defRPr>
+            </a:lvl5pPr>
+            <a:lvl6pPr marL="2286000" indent="0" algn="ctr" defTabSz="914400" rtl="0" eaLnBrk="1" latinLnBrk="0" hangingPunct="1">
+              <a:lnSpc>
+                <a:spcPct val="90000"/>
+              </a:lnSpc>
+              <a:spcBef>
+                <a:spcPts val="500"/>
+              </a:spcBef>
+              <a:buFont typeface="Arial" panose="020B0604020202020204" pitchFamily="34" charset="0"/>
+              <a:buNone/>
+              <a:defRPr sz="1600" kern="1200">
+                <a:solidFill>
+                  <a:schemeClr val="tx1"/>
+                </a:solidFill>
+                <a:latin typeface="+mn-lt"/>
+                <a:ea typeface="+mn-ea"/>
+                <a:cs typeface="+mn-cs"/>
+              </a:defRPr>
+            </a:lvl6pPr>
+            <a:lvl7pPr marL="2743200" indent="0" algn="ctr" defTabSz="914400" rtl="0" eaLnBrk="1" latinLnBrk="0" hangingPunct="1">
+              <a:lnSpc>
+                <a:spcPct val="90000"/>
+              </a:lnSpc>
+              <a:spcBef>
+                <a:spcPts val="500"/>
+              </a:spcBef>
+              <a:buFont typeface="Arial" panose="020B0604020202020204" pitchFamily="34" charset="0"/>
+              <a:buNone/>
+              <a:defRPr sz="1600" kern="1200">
+                <a:solidFill>
+                  <a:schemeClr val="tx1"/>
+                </a:solidFill>
+                <a:latin typeface="+mn-lt"/>
+                <a:ea typeface="+mn-ea"/>
+                <a:cs typeface="+mn-cs"/>
+              </a:defRPr>
+            </a:lvl7pPr>
+            <a:lvl8pPr marL="3200400" indent="0" algn="ctr" defTabSz="914400" rtl="0" eaLnBrk="1" latinLnBrk="0" hangingPunct="1">
+              <a:lnSpc>
+                <a:spcPct val="90000"/>
+              </a:lnSpc>
+              <a:spcBef>
+                <a:spcPts val="500"/>
+              </a:spcBef>
+              <a:buFont typeface="Arial" panose="020B0604020202020204" pitchFamily="34" charset="0"/>
+              <a:buNone/>
+              <a:defRPr sz="1600" kern="1200">
+                <a:solidFill>
+                  <a:schemeClr val="tx1"/>
+                </a:solidFill>
+                <a:latin typeface="+mn-lt"/>
+                <a:ea typeface="+mn-ea"/>
+                <a:cs typeface="+mn-cs"/>
+              </a:defRPr>
+            </a:lvl8pPr>
+            <a:lvl9pPr marL="3657600" indent="0" algn="ctr" defTabSz="914400" rtl="0" eaLnBrk="1" latinLnBrk="0" hangingPunct="1">
+              <a:lnSpc>
+                <a:spcPct val="90000"/>
+              </a:lnSpc>
+              <a:spcBef>
+                <a:spcPts val="500"/>
+              </a:spcBef>
+              <a:buFont typeface="Arial" panose="020B0604020202020204" pitchFamily="34" charset="0"/>
+              <a:buNone/>
+              <a:defRPr sz="1600" kern="1200">
+                <a:solidFill>
+                  <a:schemeClr val="tx1"/>
+                </a:solidFill>
+                <a:latin typeface="+mn-lt"/>
+                <a:ea typeface="+mn-ea"/>
+                <a:cs typeface="+mn-cs"/>
+              </a:defRPr>
+            </a:lvl9pPr>
+          </a:lstStyle>
+          <a:p>
+            <a:r>
+              <a:rPr lang="en-US" dirty="0"/>
+              <a:t>Image linked to file</a:t>
+            </a:r>
+          </a:p>
+        </p:txBody>
+      </p:sp>
     </p:spTree>
     <p:extLst>
       <p:ext uri="{BB962C8B-B14F-4D97-AF65-F5344CB8AC3E}">

</xml_diff>